<commit_message>
Upated and Added PowerPoints
</commit_message>
<xml_diff>
--- a/Presentations/CNU Acceptable Use.pptx
+++ b/Presentations/CNU Acceptable Use.pptx
@@ -2724,7 +2724,7 @@
             <a:fld id="{5586B75A-687E-405C-8A0B-8D00578BA2C3}" type="datetimeFigureOut">
               <a:rPr lang="en-US" dirty="0"/>
               <a:pPr/>
-              <a:t>3/21/22</a:t>
+              <a:t>4/3/22</a:t>
             </a:fld>
             <a:endParaRPr lang="en-US" dirty="0"/>
           </a:p>
@@ -2891,7 +2891,7 @@
             <a:fld id="{5586B75A-687E-405C-8A0B-8D00578BA2C3}" type="datetimeFigureOut">
               <a:rPr lang="en-US" dirty="0"/>
               <a:pPr/>
-              <a:t>3/21/22</a:t>
+              <a:t>4/3/22</a:t>
             </a:fld>
             <a:endParaRPr lang="en-US" dirty="0"/>
           </a:p>
@@ -3068,7 +3068,7 @@
             <a:fld id="{5586B75A-687E-405C-8A0B-8D00578BA2C3}" type="datetimeFigureOut">
               <a:rPr lang="en-US" dirty="0"/>
               <a:pPr/>
-              <a:t>3/21/22</a:t>
+              <a:t>4/3/22</a:t>
             </a:fld>
             <a:endParaRPr lang="en-US" dirty="0"/>
           </a:p>
@@ -3235,7 +3235,7 @@
             <a:fld id="{5586B75A-687E-405C-8A0B-8D00578BA2C3}" type="datetimeFigureOut">
               <a:rPr lang="en-US" dirty="0"/>
               <a:pPr/>
-              <a:t>3/21/22</a:t>
+              <a:t>4/3/22</a:t>
             </a:fld>
             <a:endParaRPr lang="en-US" dirty="0"/>
           </a:p>
@@ -3490,7 +3490,7 @@
             <a:fld id="{5586B75A-687E-405C-8A0B-8D00578BA2C3}" type="datetimeFigureOut">
               <a:rPr lang="en-US" dirty="0"/>
               <a:pPr/>
-              <a:t>3/21/22</a:t>
+              <a:t>4/3/22</a:t>
             </a:fld>
             <a:endParaRPr lang="en-US" dirty="0"/>
           </a:p>
@@ -3775,7 +3775,7 @@
             <a:fld id="{5586B75A-687E-405C-8A0B-8D00578BA2C3}" type="datetimeFigureOut">
               <a:rPr lang="en-US" dirty="0"/>
               <a:pPr/>
-              <a:t>3/21/22</a:t>
+              <a:t>4/3/22</a:t>
             </a:fld>
             <a:endParaRPr lang="en-US" dirty="0"/>
           </a:p>
@@ -4214,7 +4214,7 @@
             <a:fld id="{5586B75A-687E-405C-8A0B-8D00578BA2C3}" type="datetimeFigureOut">
               <a:rPr lang="en-US" dirty="0"/>
               <a:pPr/>
-              <a:t>3/21/22</a:t>
+              <a:t>4/3/22</a:t>
             </a:fld>
             <a:endParaRPr lang="en-US" dirty="0"/>
           </a:p>
@@ -4329,7 +4329,7 @@
             <a:fld id="{5586B75A-687E-405C-8A0B-8D00578BA2C3}" type="datetimeFigureOut">
               <a:rPr lang="en-US" dirty="0"/>
               <a:pPr/>
-              <a:t>3/21/22</a:t>
+              <a:t>4/3/22</a:t>
             </a:fld>
             <a:endParaRPr lang="en-US" dirty="0"/>
           </a:p>
@@ -4421,7 +4421,7 @@
             <a:fld id="{5586B75A-687E-405C-8A0B-8D00578BA2C3}" type="datetimeFigureOut">
               <a:rPr lang="en-US" dirty="0"/>
               <a:pPr/>
-              <a:t>3/21/22</a:t>
+              <a:t>4/3/22</a:t>
             </a:fld>
             <a:endParaRPr lang="en-US" dirty="0"/>
           </a:p>
@@ -4706,7 +4706,7 @@
             <a:fld id="{5586B75A-687E-405C-8A0B-8D00578BA2C3}" type="datetimeFigureOut">
               <a:rPr lang="en-US" dirty="0"/>
               <a:pPr/>
-              <a:t>3/21/22</a:t>
+              <a:t>4/3/22</a:t>
             </a:fld>
             <a:endParaRPr lang="en-US" dirty="0"/>
           </a:p>
@@ -4976,7 +4976,7 @@
             <a:fld id="{5586B75A-687E-405C-8A0B-8D00578BA2C3}" type="datetimeFigureOut">
               <a:rPr lang="en-US" dirty="0"/>
               <a:pPr/>
-              <a:t>3/21/22</a:t>
+              <a:t>4/3/22</a:t>
             </a:fld>
             <a:endParaRPr lang="en-US" dirty="0"/>
           </a:p>
@@ -5270,7 +5270,7 @@
             <a:fld id="{5586B75A-687E-405C-8A0B-8D00578BA2C3}" type="datetimeFigureOut">
               <a:rPr lang="en-US" dirty="0"/>
               <a:pPr/>
-              <a:t>3/21/22</a:t>
+              <a:t>4/3/22</a:t>
             </a:fld>
             <a:endParaRPr lang="en-US" dirty="0"/>
           </a:p>
@@ -6423,6 +6423,54 @@
           </a:p>
         </p:txBody>
       </p:sp>
+      <p:sp>
+        <p:nvSpPr>
+          <p:cNvPr id="4" name="TextBox 3">
+            <a:extLst>
+              <a:ext uri="{FF2B5EF4-FFF2-40B4-BE49-F238E27FC236}">
+                <a16:creationId xmlns:a16="http://schemas.microsoft.com/office/drawing/2014/main" id="{6C024490-6EE0-4145-B5DC-504816108CE0}"/>
+              </a:ext>
+            </a:extLst>
+          </p:cNvPr>
+          <p:cNvSpPr txBox="1"/>
+          <p:nvPr/>
+        </p:nvSpPr>
+        <p:spPr>
+          <a:xfrm>
+            <a:off x="0" y="6602625"/>
+            <a:ext cx="11852910" cy="246221"/>
+          </a:xfrm>
+          <a:prstGeom prst="rect">
+            <a:avLst/>
+          </a:prstGeom>
+          <a:noFill/>
+        </p:spPr>
+        <p:txBody>
+          <a:bodyPr wrap="square" rtlCol="0">
+            <a:spAutoFit/>
+          </a:bodyPr>
+          <a:lstStyle/>
+          <a:p>
+            <a:r>
+              <a:rPr lang="en-US" sz="1000" dirty="0"/>
+              <a:t>https://</a:t>
+            </a:r>
+            <a:r>
+              <a:rPr lang="en-US" sz="1000" dirty="0" err="1"/>
+              <a:t>www.techopedia.com</a:t>
+            </a:r>
+            <a:r>
+              <a:rPr lang="en-US" sz="1000" dirty="0"/>
+              <a:t>/definition/2471/acceptable-use-policy-</a:t>
+            </a:r>
+            <a:r>
+              <a:rPr lang="en-US" sz="1000" dirty="0" err="1"/>
+              <a:t>aup</a:t>
+            </a:r>
+            <a:endParaRPr lang="en-US" sz="1000" dirty="0"/>
+          </a:p>
+        </p:txBody>
+      </p:sp>
     </p:spTree>
     <p:extLst>
       <p:ext uri="{BB962C8B-B14F-4D97-AF65-F5344CB8AC3E}">
@@ -6677,6 +6725,41 @@
           </a:p>
         </p:txBody>
       </p:sp>
+      <p:sp>
+        <p:nvSpPr>
+          <p:cNvPr id="6" name="TextBox 5">
+            <a:extLst>
+              <a:ext uri="{FF2B5EF4-FFF2-40B4-BE49-F238E27FC236}">
+                <a16:creationId xmlns:a16="http://schemas.microsoft.com/office/drawing/2014/main" id="{2133F8F7-5613-4A42-B48B-7CE95FA04D7D}"/>
+              </a:ext>
+            </a:extLst>
+          </p:cNvPr>
+          <p:cNvSpPr txBox="1"/>
+          <p:nvPr/>
+        </p:nvSpPr>
+        <p:spPr>
+          <a:xfrm>
+            <a:off x="0" y="6602625"/>
+            <a:ext cx="11852910" cy="246221"/>
+          </a:xfrm>
+          <a:prstGeom prst="rect">
+            <a:avLst/>
+          </a:prstGeom>
+          <a:noFill/>
+        </p:spPr>
+        <p:txBody>
+          <a:bodyPr wrap="square" rtlCol="0">
+            <a:spAutoFit/>
+          </a:bodyPr>
+          <a:lstStyle/>
+          <a:p>
+            <a:r>
+              <a:rPr lang="en-US" sz="1000" dirty="0"/>
+              <a:t>CNU Acceptable Use Policy</a:t>
+            </a:r>
+          </a:p>
+        </p:txBody>
+      </p:sp>
     </p:spTree>
     <p:extLst>
       <p:ext uri="{BB962C8B-B14F-4D97-AF65-F5344CB8AC3E}">
@@ -6957,6 +7040,41 @@
           </a:p>
         </p:txBody>
       </p:sp>
+      <p:sp>
+        <p:nvSpPr>
+          <p:cNvPr id="6" name="TextBox 5">
+            <a:extLst>
+              <a:ext uri="{FF2B5EF4-FFF2-40B4-BE49-F238E27FC236}">
+                <a16:creationId xmlns:a16="http://schemas.microsoft.com/office/drawing/2014/main" id="{2D56FA8E-208D-6F40-B03E-B277AE5E1DF4}"/>
+              </a:ext>
+            </a:extLst>
+          </p:cNvPr>
+          <p:cNvSpPr txBox="1"/>
+          <p:nvPr/>
+        </p:nvSpPr>
+        <p:spPr>
+          <a:xfrm>
+            <a:off x="0" y="6602625"/>
+            <a:ext cx="11852910" cy="246221"/>
+          </a:xfrm>
+          <a:prstGeom prst="rect">
+            <a:avLst/>
+          </a:prstGeom>
+          <a:noFill/>
+        </p:spPr>
+        <p:txBody>
+          <a:bodyPr wrap="square" rtlCol="0">
+            <a:spAutoFit/>
+          </a:bodyPr>
+          <a:lstStyle/>
+          <a:p>
+            <a:r>
+              <a:rPr lang="en-US" sz="1000" dirty="0"/>
+              <a:t>CNU Acceptable Use Policy</a:t>
+            </a:r>
+          </a:p>
+        </p:txBody>
+      </p:sp>
     </p:spTree>
     <p:extLst>
       <p:ext uri="{BB962C8B-B14F-4D97-AF65-F5344CB8AC3E}">
@@ -7218,6 +7336,41 @@
                 </a:solidFill>
               </a:rPr>
               <a:t>Installing new software without permission</a:t>
+            </a:r>
+          </a:p>
+        </p:txBody>
+      </p:sp>
+      <p:sp>
+        <p:nvSpPr>
+          <p:cNvPr id="6" name="TextBox 5">
+            <a:extLst>
+              <a:ext uri="{FF2B5EF4-FFF2-40B4-BE49-F238E27FC236}">
+                <a16:creationId xmlns:a16="http://schemas.microsoft.com/office/drawing/2014/main" id="{30465672-FE0C-9C4D-8C01-E7A323BBCC5E}"/>
+              </a:ext>
+            </a:extLst>
+          </p:cNvPr>
+          <p:cNvSpPr txBox="1"/>
+          <p:nvPr/>
+        </p:nvSpPr>
+        <p:spPr>
+          <a:xfrm>
+            <a:off x="0" y="6602625"/>
+            <a:ext cx="11852910" cy="246221"/>
+          </a:xfrm>
+          <a:prstGeom prst="rect">
+            <a:avLst/>
+          </a:prstGeom>
+          <a:noFill/>
+        </p:spPr>
+        <p:txBody>
+          <a:bodyPr wrap="square" rtlCol="0">
+            <a:spAutoFit/>
+          </a:bodyPr>
+          <a:lstStyle/>
+          <a:p>
+            <a:r>
+              <a:rPr lang="en-US" sz="1000" dirty="0"/>
+              <a:t>CNU Acceptable Use Policy</a:t>
             </a:r>
           </a:p>
         </p:txBody>

</xml_diff>